<commit_message>
Added paradox of constraints slide.
</commit_message>
<xml_diff>
--- a/Presentation/4 Ways to Prevent Code Abuse.pptx
+++ b/Presentation/4 Ways to Prevent Code Abuse.pptx
@@ -5,7 +5,7 @@
     <p:sldMasterId id="2147483660" r:id="rId1"/>
   </p:sldMasterIdLst>
   <p:notesMasterIdLst>
-    <p:notesMasterId r:id="rId15"/>
+    <p:notesMasterId r:id="rId16"/>
   </p:notesMasterIdLst>
   <p:sldIdLst>
     <p:sldId id="256" r:id="rId2"/>
@@ -19,8 +19,9 @@
     <p:sldId id="263" r:id="rId10"/>
     <p:sldId id="275" r:id="rId11"/>
     <p:sldId id="274" r:id="rId12"/>
-    <p:sldId id="277" r:id="rId13"/>
-    <p:sldId id="280" r:id="rId14"/>
+    <p:sldId id="281" r:id="rId13"/>
+    <p:sldId id="277" r:id="rId14"/>
+    <p:sldId id="280" r:id="rId15"/>
   </p:sldIdLst>
   <p:sldSz cx="9144000" cy="6858000" type="screen4x3"/>
   <p:notesSz cx="6858000" cy="9144000"/>
@@ -205,7 +206,7 @@
             <a:fld id="{CF6EB8F4-F731-44EF-AF40-3FD2AB13EFEA}" type="datetimeFigureOut">
               <a:rPr lang="en-US" smtClean="0"/>
               <a:pPr/>
-              <a:t>5/17/2012</a:t>
+              <a:t>5/18/2012</a:t>
             </a:fld>
             <a:endParaRPr lang="en-US"/>
           </a:p>
@@ -1052,7 +1053,7 @@
             <a:fld id="{1D8BD707-D9CF-40AE-B4C6-C98DA3205C09}" type="datetimeFigureOut">
               <a:rPr lang="en-US" smtClean="0"/>
               <a:pPr/>
-              <a:t>5/17/2012</a:t>
+              <a:t>5/18/2012</a:t>
             </a:fld>
             <a:endParaRPr lang="en-US"/>
           </a:p>
@@ -1219,7 +1220,7 @@
             <a:fld id="{1D8BD707-D9CF-40AE-B4C6-C98DA3205C09}" type="datetimeFigureOut">
               <a:rPr lang="en-US" smtClean="0"/>
               <a:pPr/>
-              <a:t>5/17/2012</a:t>
+              <a:t>5/18/2012</a:t>
             </a:fld>
             <a:endParaRPr lang="en-US"/>
           </a:p>
@@ -1396,7 +1397,7 @@
             <a:fld id="{1D8BD707-D9CF-40AE-B4C6-C98DA3205C09}" type="datetimeFigureOut">
               <a:rPr lang="en-US" smtClean="0"/>
               <a:pPr/>
-              <a:t>5/17/2012</a:t>
+              <a:t>5/18/2012</a:t>
             </a:fld>
             <a:endParaRPr lang="en-US"/>
           </a:p>
@@ -1567,7 +1568,7 @@
             <a:fld id="{1D8BD707-D9CF-40AE-B4C6-C98DA3205C09}" type="datetimeFigureOut">
               <a:rPr lang="en-US" smtClean="0"/>
               <a:pPr/>
-              <a:t>5/17/2012</a:t>
+              <a:t>5/18/2012</a:t>
             </a:fld>
             <a:endParaRPr lang="en-US"/>
           </a:p>
@@ -1823,7 +1824,7 @@
             <a:fld id="{1D8BD707-D9CF-40AE-B4C6-C98DA3205C09}" type="datetimeFigureOut">
               <a:rPr lang="en-US" smtClean="0"/>
               <a:pPr/>
-              <a:t>5/17/2012</a:t>
+              <a:t>5/18/2012</a:t>
             </a:fld>
             <a:endParaRPr lang="en-US"/>
           </a:p>
@@ -2089,7 +2090,7 @@
             <a:fld id="{1D8BD707-D9CF-40AE-B4C6-C98DA3205C09}" type="datetimeFigureOut">
               <a:rPr lang="en-US" smtClean="0"/>
               <a:pPr/>
-              <a:t>5/17/2012</a:t>
+              <a:t>5/18/2012</a:t>
             </a:fld>
             <a:endParaRPr lang="en-US"/>
           </a:p>
@@ -2465,7 +2466,7 @@
             <a:fld id="{1D8BD707-D9CF-40AE-B4C6-C98DA3205C09}" type="datetimeFigureOut">
               <a:rPr lang="en-US" smtClean="0"/>
               <a:pPr/>
-              <a:t>5/17/2012</a:t>
+              <a:t>5/18/2012</a:t>
             </a:fld>
             <a:endParaRPr lang="en-US"/>
           </a:p>
@@ -2589,7 +2590,7 @@
             <a:fld id="{1D8BD707-D9CF-40AE-B4C6-C98DA3205C09}" type="datetimeFigureOut">
               <a:rPr lang="en-US" smtClean="0"/>
               <a:pPr/>
-              <a:t>5/17/2012</a:t>
+              <a:t>5/18/2012</a:t>
             </a:fld>
             <a:endParaRPr lang="en-US"/>
           </a:p>
@@ -2681,7 +2682,7 @@
             <a:fld id="{1D8BD707-D9CF-40AE-B4C6-C98DA3205C09}" type="datetimeFigureOut">
               <a:rPr lang="en-US" smtClean="0"/>
               <a:pPr/>
-              <a:t>5/17/2012</a:t>
+              <a:t>5/18/2012</a:t>
             </a:fld>
             <a:endParaRPr lang="en-US"/>
           </a:p>
@@ -2932,7 +2933,7 @@
             <a:fld id="{1D8BD707-D9CF-40AE-B4C6-C98DA3205C09}" type="datetimeFigureOut">
               <a:rPr lang="en-US" smtClean="0"/>
               <a:pPr/>
-              <a:t>5/17/2012</a:t>
+              <a:t>5/18/2012</a:t>
             </a:fld>
             <a:endParaRPr lang="en-US"/>
           </a:p>
@@ -3193,7 +3194,7 @@
             <a:fld id="{1D8BD707-D9CF-40AE-B4C6-C98DA3205C09}" type="datetimeFigureOut">
               <a:rPr lang="en-US" smtClean="0"/>
               <a:pPr/>
-              <a:t>5/17/2012</a:t>
+              <a:t>5/18/2012</a:t>
             </a:fld>
             <a:endParaRPr lang="en-US"/>
           </a:p>
@@ -3415,7 +3416,7 @@
             <a:fld id="{1D8BD707-D9CF-40AE-B4C6-C98DA3205C09}" type="datetimeFigureOut">
               <a:rPr lang="en-US" smtClean="0"/>
               <a:pPr/>
-              <a:t>5/17/2012</a:t>
+              <a:t>5/18/2012</a:t>
             </a:fld>
             <a:endParaRPr lang="en-US"/>
           </a:p>
@@ -5066,6 +5067,117 @@
           <a:chExt cx="0" cy="0"/>
         </a:xfrm>
       </p:grpSpPr>
+      <p:pic>
+        <p:nvPicPr>
+          <p:cNvPr id="1026" name="Picture 2" descr="C:\Users\dit3074\Pictures\Constraints\05_gx_carpool_lane_500.jpg"/>
+          <p:cNvPicPr>
+            <a:picLocks noChangeAspect="1" noChangeArrowheads="1"/>
+          </p:cNvPicPr>
+          <p:nvPr/>
+        </p:nvPicPr>
+        <p:blipFill rotWithShape="1">
+          <a:blip r:embed="rId2">
+            <a:extLst>
+              <a:ext uri="{28A0092B-C50C-407E-A947-70E740481C1C}">
+                <a14:useLocalDpi xmlns:a14="http://schemas.microsoft.com/office/drawing/2010/main" val="0"/>
+              </a:ext>
+            </a:extLst>
+          </a:blip>
+          <a:srcRect l="16464" r="-1"/>
+          <a:stretch/>
+        </p:blipFill>
+        <p:spPr bwMode="auto">
+          <a:xfrm>
+            <a:off x="0" y="-38100"/>
+            <a:ext cx="9144000" cy="6896100"/>
+          </a:xfrm>
+          <a:prstGeom prst="rect">
+            <a:avLst/>
+          </a:prstGeom>
+          <a:noFill/>
+          <a:extLst>
+            <a:ext uri="{909E8E84-426E-40DD-AFC4-6F175D3DCCD1}">
+              <a14:hiddenFill xmlns:a14="http://schemas.microsoft.com/office/drawing/2010/main">
+                <a:solidFill>
+                  <a:srgbClr val="FFFFFF"/>
+                </a:solidFill>
+              </a14:hiddenFill>
+            </a:ext>
+          </a:extLst>
+        </p:spPr>
+      </p:pic>
+      <p:sp>
+        <p:nvSpPr>
+          <p:cNvPr id="2" name="Title 1"/>
+          <p:cNvSpPr>
+            <a:spLocks noGrp="1"/>
+          </p:cNvSpPr>
+          <p:nvPr>
+            <p:ph type="title"/>
+          </p:nvPr>
+        </p:nvSpPr>
+        <p:spPr>
+          <a:xfrm>
+            <a:off x="457200" y="274638"/>
+            <a:ext cx="8458200" cy="1143000"/>
+          </a:xfrm>
+          <a:solidFill>
+            <a:schemeClr val="bg1">
+              <a:alpha val="26000"/>
+            </a:schemeClr>
+          </a:solidFill>
+        </p:spPr>
+        <p:txBody>
+          <a:bodyPr>
+            <a:noAutofit/>
+          </a:bodyPr>
+          <a:lstStyle/>
+          <a:p>
+            <a:r>
+              <a:rPr lang="en-US" sz="5400" dirty="0" smtClean="0"/>
+              <a:t>Paradox of Constraints</a:t>
+            </a:r>
+            <a:endParaRPr lang="en-US" sz="5400" dirty="0"/>
+          </a:p>
+        </p:txBody>
+      </p:sp>
+    </p:spTree>
+    <p:extLst>
+      <p:ext uri="{BB962C8B-B14F-4D97-AF65-F5344CB8AC3E}">
+        <p14:creationId xmlns:p14="http://schemas.microsoft.com/office/powerpoint/2010/main" val="3214154538"/>
+      </p:ext>
+    </p:extLst>
+  </p:cSld>
+  <p:clrMapOvr>
+    <a:masterClrMapping/>
+  </p:clrMapOvr>
+  <p:timing>
+    <p:tnLst>
+      <p:par>
+        <p:cTn id="1" dur="indefinite" restart="never" nodeType="tmRoot"/>
+      </p:par>
+    </p:tnLst>
+  </p:timing>
+</p:sld>
+</file>
+
+<file path=ppt/slides/slide13.xml><?xml version="1.0" encoding="utf-8"?>
+<p:sld xmlns:a="http://schemas.openxmlformats.org/drawingml/2006/main" xmlns:r="http://schemas.openxmlformats.org/officeDocument/2006/relationships" xmlns:p="http://schemas.openxmlformats.org/presentationml/2006/main">
+  <p:cSld>
+    <p:spTree>
+      <p:nvGrpSpPr>
+        <p:cNvPr id="1" name=""/>
+        <p:cNvGrpSpPr/>
+        <p:nvPr/>
+      </p:nvGrpSpPr>
+      <p:grpSpPr>
+        <a:xfrm>
+          <a:off x="0" y="0"/>
+          <a:ext cx="0" cy="0"/>
+          <a:chOff x="0" y="0"/>
+          <a:chExt cx="0" cy="0"/>
+        </a:xfrm>
+      </p:grpSpPr>
       <p:sp>
         <p:nvSpPr>
           <p:cNvPr id="2" name="Title 1"/>
@@ -5178,7 +5290,7 @@
 </p:sld>
 </file>
 
-<file path=ppt/slides/slide13.xml><?xml version="1.0" encoding="utf-8"?>
+<file path=ppt/slides/slide14.xml><?xml version="1.0" encoding="utf-8"?>
 <p:sld xmlns:a="http://schemas.openxmlformats.org/drawingml/2006/main" xmlns:r="http://schemas.openxmlformats.org/officeDocument/2006/relationships" xmlns:p="http://schemas.openxmlformats.org/presentationml/2006/main">
   <p:cSld>
     <p:spTree>

</xml_diff>